<commit_message>
New 'Please log in' alert on login page for redirects
</commit_message>
<xml_diff>
--- a/Documents/Final presentation/Fit or Fail Final Presentation.pptx
+++ b/Documents/Final presentation/Fit or Fail Final Presentation.pptx
@@ -260,7 +260,7 @@
           <a:p>
             <a:fld id="{92002A70-311A-4772-9C04-FF4E337CEBA6}" type="datetimeFigureOut">
               <a:rPr lang="en-US" smtClean="0"/>
-              <a:t>4/23/2020</a:t>
+              <a:t>4/24/2020</a:t>
             </a:fld>
             <a:endParaRPr lang="en-US"/>
           </a:p>
@@ -471,7 +471,7 @@
           <a:p>
             <a:fld id="{92002A70-311A-4772-9C04-FF4E337CEBA6}" type="datetimeFigureOut">
               <a:rPr lang="en-US" smtClean="0"/>
-              <a:t>4/23/2020</a:t>
+              <a:t>4/24/2020</a:t>
             </a:fld>
             <a:endParaRPr lang="en-US"/>
           </a:p>
@@ -686,7 +686,7 @@
           <a:p>
             <a:fld id="{92002A70-311A-4772-9C04-FF4E337CEBA6}" type="datetimeFigureOut">
               <a:rPr lang="en-US" smtClean="0"/>
-              <a:t>4/23/2020</a:t>
+              <a:t>4/24/2020</a:t>
             </a:fld>
             <a:endParaRPr lang="en-US"/>
           </a:p>
@@ -887,7 +887,7 @@
           <a:p>
             <a:fld id="{92002A70-311A-4772-9C04-FF4E337CEBA6}" type="datetimeFigureOut">
               <a:rPr lang="en-US" smtClean="0"/>
-              <a:t>4/23/2020</a:t>
+              <a:t>4/24/2020</a:t>
             </a:fld>
             <a:endParaRPr lang="en-US"/>
           </a:p>
@@ -1166,7 +1166,7 @@
           <a:p>
             <a:fld id="{92002A70-311A-4772-9C04-FF4E337CEBA6}" type="datetimeFigureOut">
               <a:rPr lang="en-US" smtClean="0"/>
-              <a:t>4/23/2020</a:t>
+              <a:t>4/24/2020</a:t>
             </a:fld>
             <a:endParaRPr lang="en-US"/>
           </a:p>
@@ -1434,7 +1434,7 @@
           <a:p>
             <a:fld id="{92002A70-311A-4772-9C04-FF4E337CEBA6}" type="datetimeFigureOut">
               <a:rPr lang="en-US" smtClean="0"/>
-              <a:t>4/23/2020</a:t>
+              <a:t>4/24/2020</a:t>
             </a:fld>
             <a:endParaRPr lang="en-US"/>
           </a:p>
@@ -1855,7 +1855,7 @@
           <a:p>
             <a:fld id="{92002A70-311A-4772-9C04-FF4E337CEBA6}" type="datetimeFigureOut">
               <a:rPr lang="en-US" smtClean="0"/>
-              <a:t>4/23/2020</a:t>
+              <a:t>4/24/2020</a:t>
             </a:fld>
             <a:endParaRPr lang="en-US"/>
           </a:p>
@@ -2009,7 +2009,7 @@
           <a:p>
             <a:fld id="{92002A70-311A-4772-9C04-FF4E337CEBA6}" type="datetimeFigureOut">
               <a:rPr lang="en-US" smtClean="0"/>
-              <a:t>4/23/2020</a:t>
+              <a:t>4/24/2020</a:t>
             </a:fld>
             <a:endParaRPr lang="en-US"/>
           </a:p>
@@ -2135,7 +2135,7 @@
           <a:p>
             <a:fld id="{92002A70-311A-4772-9C04-FF4E337CEBA6}" type="datetimeFigureOut">
               <a:rPr lang="en-US" smtClean="0"/>
-              <a:t>4/23/2020</a:t>
+              <a:t>4/24/2020</a:t>
             </a:fld>
             <a:endParaRPr lang="en-US"/>
           </a:p>
@@ -2386,7 +2386,7 @@
           <a:p>
             <a:fld id="{92002A70-311A-4772-9C04-FF4E337CEBA6}" type="datetimeFigureOut">
               <a:rPr lang="en-US" smtClean="0"/>
-              <a:t>4/23/2020</a:t>
+              <a:t>4/24/2020</a:t>
             </a:fld>
             <a:endParaRPr lang="en-US"/>
           </a:p>
@@ -2836,7 +2836,7 @@
           <a:p>
             <a:fld id="{92002A70-311A-4772-9C04-FF4E337CEBA6}" type="datetimeFigureOut">
               <a:rPr lang="en-US" smtClean="0"/>
-              <a:t>4/23/2020</a:t>
+              <a:t>4/24/2020</a:t>
             </a:fld>
             <a:endParaRPr lang="en-US"/>
           </a:p>
@@ -3162,7 +3162,7 @@
           <a:p>
             <a:fld id="{92002A70-311A-4772-9C04-FF4E337CEBA6}" type="datetimeFigureOut">
               <a:rPr lang="en-US" smtClean="0"/>
-              <a:t>4/23/2020</a:t>
+              <a:t>4/24/2020</a:t>
             </a:fld>
             <a:endParaRPr lang="en-US"/>
           </a:p>
@@ -3972,8 +3972,13 @@
             </a:pPr>
             <a:r>
               <a:rPr lang="en-US" dirty="0" smtClean="0"/>
-              <a:t>Server-Side Rendering and Static Site Generation</a:t>
-            </a:r>
+              <a:t>Server-Side Rendering and </a:t>
+            </a:r>
+            <a:r>
+              <a:rPr lang="en-US" dirty="0" smtClean="0"/>
+              <a:t>pre-rendering to static HTML</a:t>
+            </a:r>
+            <a:endParaRPr lang="en-US" dirty="0" smtClean="0"/>
           </a:p>
           <a:p>
             <a:pPr marL="1200150" lvl="2" indent="-285750">
@@ -5191,11 +5196,7 @@
             </a:r>
             <a:r>
               <a:rPr lang="en-US" dirty="0" smtClean="0"/>
-              <a:t>– </a:t>
-            </a:r>
-            <a:r>
-              <a:rPr lang="en-US" dirty="0" smtClean="0"/>
-              <a:t>Entire backend and frontend, primary designer, </a:t>
+              <a:t>– Entire backend and frontend, primary designer, </a:t>
             </a:r>
             <a:r>
               <a:rPr lang="en-US" dirty="0"/>
@@ -5205,7 +5206,6 @@
               <a:rPr lang="en-US" dirty="0" smtClean="0"/>
               <a:t>coordinator</a:t>
             </a:r>
-            <a:endParaRPr lang="en-US" dirty="0" smtClean="0"/>
           </a:p>
           <a:p>
             <a:r>

</xml_diff>

<commit_message>
Better styling and animations on solo game; also fixed the display of an error upon losing authentication mid-game
</commit_message>
<xml_diff>
--- a/Documents/Final presentation/Fit or Fail Final Presentation.pptx
+++ b/Documents/Final presentation/Fit or Fail Final Presentation.pptx
@@ -3972,13 +3972,8 @@
             </a:pPr>
             <a:r>
               <a:rPr lang="en-US" dirty="0" smtClean="0"/>
-              <a:t>Server-Side Rendering and </a:t>
-            </a:r>
-            <a:r>
-              <a:rPr lang="en-US" dirty="0" smtClean="0"/>
-              <a:t>pre-rendering to static HTML</a:t>
-            </a:r>
-            <a:endParaRPr lang="en-US" dirty="0" smtClean="0"/>
+              <a:t>Server-Side Rendering and pre-rendering to static HTML</a:t>
+            </a:r>
           </a:p>
           <a:p>
             <a:pPr marL="1200150" lvl="2" indent="-285750">
@@ -6303,25 +6298,25 @@
               <a:buAutoNum type="arabicPeriod"/>
             </a:pPr>
             <a:r>
-              <a:rPr lang="en-US" sz="1400" dirty="0"/>
+              <a:rPr lang="en-US" sz="1600" dirty="0"/>
               <a:t>Live multiplayer mode</a:t>
             </a:r>
           </a:p>
           <a:p>
             <a:pPr lvl="1"/>
             <a:r>
-              <a:rPr lang="en-US" sz="1000" dirty="0" err="1"/>
+              <a:rPr lang="en-US" sz="1200" dirty="0" err="1"/>
               <a:t>Kahoot</a:t>
             </a:r>
             <a:r>
-              <a:rPr lang="en-US" sz="1000" dirty="0"/>
+              <a:rPr lang="en-US" sz="1200" dirty="0"/>
               <a:t>!</a:t>
             </a:r>
           </a:p>
           <a:p>
             <a:pPr lvl="1"/>
             <a:r>
-              <a:rPr lang="en-US" sz="1000" dirty="0"/>
+              <a:rPr lang="en-US" sz="1200" dirty="0"/>
               <a:t>User Teams</a:t>
             </a:r>
           </a:p>
@@ -6331,21 +6326,21 @@
               <a:buAutoNum type="arabicPeriod"/>
             </a:pPr>
             <a:r>
-              <a:rPr lang="en-US" sz="1400" dirty="0"/>
+              <a:rPr lang="en-US" sz="1600" dirty="0"/>
               <a:t>Continue to add questions to the game</a:t>
             </a:r>
           </a:p>
           <a:p>
             <a:pPr lvl="1"/>
             <a:r>
-              <a:rPr lang="en-US" sz="1000" dirty="0"/>
+              <a:rPr lang="en-US" sz="1200" dirty="0"/>
               <a:t>Separation of question categories; different game “themes”</a:t>
             </a:r>
           </a:p>
           <a:p>
             <a:pPr lvl="2"/>
             <a:r>
-              <a:rPr lang="en-US" sz="1000" dirty="0"/>
+              <a:rPr lang="en-US" sz="1200" dirty="0"/>
               <a:t>Ex: Healthy eating, muscle development, etc.</a:t>
             </a:r>
           </a:p>
@@ -6355,7 +6350,7 @@
               <a:buAutoNum type="arabicPeriod"/>
             </a:pPr>
             <a:r>
-              <a:rPr lang="en-US" sz="1400" dirty="0"/>
+              <a:rPr lang="en-US" sz="1600" dirty="0"/>
               <a:t>Full donations implementation</a:t>
             </a:r>
           </a:p>
@@ -6365,21 +6360,21 @@
               <a:buAutoNum type="arabicPeriod"/>
             </a:pPr>
             <a:r>
-              <a:rPr lang="en-US" sz="1400" dirty="0"/>
+              <a:rPr lang="en-US" sz="1600" dirty="0"/>
               <a:t>Work with advertisers to curate appropriate advertising and consistent funding</a:t>
             </a:r>
           </a:p>
           <a:p>
             <a:pPr lvl="1"/>
             <a:r>
-              <a:rPr lang="en-US" sz="1000" dirty="0"/>
+              <a:rPr lang="en-US" sz="1200" dirty="0"/>
               <a:t>System for ads to be reviews by government officials before they’re </a:t>
             </a:r>
             <a:r>
-              <a:rPr lang="en-US" sz="1000" dirty="0" smtClean="0"/>
+              <a:rPr lang="en-US" sz="1200" dirty="0" smtClean="0"/>
               <a:t>posted</a:t>
             </a:r>
-            <a:endParaRPr lang="en-US" sz="1000" dirty="0"/>
+            <a:endParaRPr lang="en-US" sz="1200" dirty="0"/>
           </a:p>
         </p:txBody>
       </p:sp>
@@ -6408,74 +6403,74 @@
               <a:buAutoNum type="arabicPeriod" startAt="5"/>
             </a:pPr>
             <a:r>
-              <a:rPr lang="en-US" sz="1400" dirty="0"/>
+              <a:rPr lang="en-US" sz="1600" dirty="0"/>
               <a:t>New features coming in the future, such as</a:t>
             </a:r>
             <a:r>
-              <a:rPr lang="en-US" sz="1400" dirty="0" smtClean="0"/>
+              <a:rPr lang="en-US" sz="1600" dirty="0" smtClean="0"/>
               <a:t>:</a:t>
             </a:r>
-            <a:endParaRPr lang="en-US" sz="1400" dirty="0"/>
+            <a:endParaRPr lang="en-US" sz="1600" dirty="0"/>
           </a:p>
           <a:p>
             <a:pPr lvl="1"/>
             <a:r>
-              <a:rPr lang="en-US" sz="1000" dirty="0" smtClean="0"/>
+              <a:rPr lang="en-US" sz="1200" dirty="0" smtClean="0"/>
               <a:t>Custom profile pictures</a:t>
             </a:r>
           </a:p>
           <a:p>
             <a:pPr lvl="1"/>
             <a:r>
-              <a:rPr lang="en-US" sz="1000" dirty="0" smtClean="0"/>
+              <a:rPr lang="en-US" sz="1200" dirty="0" smtClean="0"/>
               <a:t>Editable </a:t>
             </a:r>
             <a:r>
-              <a:rPr lang="en-US" sz="1000" dirty="0" err="1" smtClean="0"/>
+              <a:rPr lang="en-US" sz="1200" dirty="0" err="1" smtClean="0"/>
               <a:t>userpages</a:t>
             </a:r>
-            <a:endParaRPr lang="en-US" sz="1000" dirty="0"/>
+            <a:endParaRPr lang="en-US" sz="1200" dirty="0"/>
           </a:p>
           <a:p>
             <a:pPr lvl="2"/>
             <a:r>
-              <a:rPr lang="en-US" sz="1000" dirty="0"/>
+              <a:rPr lang="en-US" sz="1200" dirty="0"/>
               <a:t>Bio, background color</a:t>
             </a:r>
           </a:p>
           <a:p>
             <a:pPr lvl="1"/>
             <a:r>
-              <a:rPr lang="en-US" sz="1000" dirty="0"/>
+              <a:rPr lang="en-US" sz="1200" dirty="0"/>
               <a:t>Friends list</a:t>
             </a:r>
           </a:p>
           <a:p>
             <a:pPr lvl="1"/>
             <a:r>
-              <a:rPr lang="en-US" sz="1000" dirty="0" smtClean="0"/>
+              <a:rPr lang="en-US" sz="1200" dirty="0" smtClean="0"/>
               <a:t>Donor role</a:t>
             </a:r>
           </a:p>
           <a:p>
             <a:pPr lvl="1"/>
             <a:r>
-              <a:rPr lang="en-US" sz="1000" dirty="0" smtClean="0"/>
+              <a:rPr lang="en-US" sz="1200" dirty="0" smtClean="0"/>
               <a:t>Detailed </a:t>
             </a:r>
             <a:r>
-              <a:rPr lang="en-US" sz="1000" dirty="0"/>
+              <a:rPr lang="en-US" sz="1200" dirty="0"/>
               <a:t>site-wide statistics, categorized by month</a:t>
             </a:r>
           </a:p>
           <a:p>
             <a:pPr lvl="1"/>
             <a:r>
-              <a:rPr lang="en-US" sz="1000" dirty="0"/>
+              <a:rPr lang="en-US" sz="1200" dirty="0"/>
               <a:t>Generally-improved </a:t>
             </a:r>
             <a:r>
-              <a:rPr lang="en-US" sz="1000" dirty="0" smtClean="0"/>
+              <a:rPr lang="en-US" sz="1200" dirty="0" smtClean="0"/>
               <a:t>API</a:t>
             </a:r>
           </a:p>
@@ -6485,40 +6480,40 @@
               <a:buAutoNum type="arabicPeriod" startAt="6"/>
             </a:pPr>
             <a:r>
-              <a:rPr lang="en-US" sz="1400" dirty="0" smtClean="0"/>
+              <a:rPr lang="en-US" sz="1600" dirty="0" smtClean="0"/>
               <a:t>General </a:t>
             </a:r>
             <a:r>
-              <a:rPr lang="en-US" sz="1400" dirty="0"/>
+              <a:rPr lang="en-US" sz="1600" dirty="0"/>
               <a:t>site maintenance and testing</a:t>
             </a:r>
           </a:p>
           <a:p>
             <a:pPr lvl="1"/>
             <a:r>
-              <a:rPr lang="en-US" sz="1000" dirty="0"/>
+              <a:rPr lang="en-US" sz="1200" dirty="0"/>
               <a:t>Add animations throughout </a:t>
             </a:r>
             <a:r>
-              <a:rPr lang="en-US" sz="1000" dirty="0" smtClean="0"/>
+              <a:rPr lang="en-US" sz="1200" dirty="0" smtClean="0"/>
               <a:t>for </a:t>
             </a:r>
             <a:r>
-              <a:rPr lang="en-US" sz="1000" dirty="0"/>
+              <a:rPr lang="en-US" sz="1200" dirty="0"/>
               <a:t>a smoother user experience</a:t>
             </a:r>
           </a:p>
           <a:p>
             <a:pPr lvl="1"/>
             <a:r>
-              <a:rPr lang="en-US" sz="1000" dirty="0"/>
+              <a:rPr lang="en-US" sz="1200" dirty="0"/>
               <a:t>More diverse typography</a:t>
             </a:r>
           </a:p>
           <a:p>
             <a:pPr lvl="1"/>
             <a:r>
-              <a:rPr lang="en-US" sz="1000" dirty="0"/>
+              <a:rPr lang="en-US" sz="1200" dirty="0"/>
               <a:t>Mobile optimizations where needed</a:t>
             </a:r>
           </a:p>

</xml_diff>